<commit_message>
+Update Drew on case plan
</commit_message>
<xml_diff>
--- a/Präsentation/Staudenmayer_Schrefl_ProjektRöhrenverstärker.pptx
+++ b/Präsentation/Staudenmayer_Schrefl_ProjektRöhrenverstärker.pptx
@@ -8231,7 +8231,7 @@
           <a:p>
             <a:fld id="{F0BEBAF8-5FE4-4E64-8992-DB975BC78031}" type="datetimeFigureOut">
               <a:rPr lang="de-AT" smtClean="0"/>
-              <a:t>05.03.2019</a:t>
+              <a:t>20.05.2019</a:t>
             </a:fld>
             <a:endParaRPr lang="de-AT"/>
           </a:p>
@@ -9244,7 +9244,7 @@
           <a:p>
             <a:fld id="{F99F593E-EDEF-46B8-8833-C0D52A73DD04}" type="datetime1">
               <a:rPr lang="en-US" smtClean="0"/>
-              <a:t>3/5/2019</a:t>
+              <a:t>5/20/2019</a:t>
             </a:fld>
             <a:endParaRPr lang="en-US" dirty="0"/>
           </a:p>
@@ -9507,7 +9507,7 @@
           <a:p>
             <a:fld id="{AA7C1DA8-F332-4722-9142-2BC01C20E9E8}" type="datetime1">
               <a:rPr lang="en-US" smtClean="0"/>
-              <a:t>3/5/2019</a:t>
+              <a:t>5/20/2019</a:t>
             </a:fld>
             <a:endParaRPr lang="en-US" dirty="0"/>
           </a:p>
@@ -9833,7 +9833,7 @@
           <a:p>
             <a:fld id="{A0E84C0C-0476-4007-8AC7-30A365E2375C}" type="datetime1">
               <a:rPr lang="en-US" smtClean="0"/>
-              <a:t>3/5/2019</a:t>
+              <a:t>5/20/2019</a:t>
             </a:fld>
             <a:endParaRPr lang="en-US" dirty="0"/>
           </a:p>
@@ -10178,7 +10178,7 @@
           <a:p>
             <a:fld id="{F3F8681C-71B6-4BB0-B273-B404D38104F5}" type="datetime1">
               <a:rPr lang="en-US" smtClean="0"/>
-              <a:t>3/5/2019</a:t>
+              <a:t>5/20/2019</a:t>
             </a:fld>
             <a:endParaRPr lang="en-US" dirty="0"/>
           </a:p>
@@ -10504,7 +10504,7 @@
           <a:p>
             <a:fld id="{F1EA43BC-B430-4139-94CD-7D9162D8D495}" type="datetime1">
               <a:rPr lang="en-US" smtClean="0"/>
-              <a:t>3/5/2019</a:t>
+              <a:t>5/20/2019</a:t>
             </a:fld>
             <a:endParaRPr lang="en-US" dirty="0"/>
           </a:p>
@@ -10909,7 +10909,7 @@
           <a:p>
             <a:fld id="{98BEA6A8-979B-4673-BF11-E1740A4CF0B1}" type="datetime1">
               <a:rPr lang="en-US" smtClean="0"/>
-              <a:t>3/5/2019</a:t>
+              <a:t>5/20/2019</a:t>
             </a:fld>
             <a:endParaRPr lang="en-US" dirty="0"/>
           </a:p>
@@ -11091,7 +11091,7 @@
           <a:p>
             <a:fld id="{E2217766-3357-49BE-97ED-B7D827AABBAB}" type="datetime1">
               <a:rPr lang="en-US" smtClean="0"/>
-              <a:t>3/5/2019</a:t>
+              <a:t>5/20/2019</a:t>
             </a:fld>
             <a:endParaRPr lang="en-US" dirty="0"/>
           </a:p>
@@ -11282,7 +11282,7 @@
           <a:p>
             <a:fld id="{93229AB2-DFCC-47E0-A781-D557CED58437}" type="datetime1">
               <a:rPr lang="en-US" smtClean="0"/>
-              <a:t>3/5/2019</a:t>
+              <a:t>5/20/2019</a:t>
             </a:fld>
             <a:endParaRPr lang="en-US" dirty="0"/>
           </a:p>
@@ -11464,7 +11464,7 @@
           <a:p>
             <a:fld id="{EA93901D-A0F7-4274-8459-BA05621425F4}" type="datetime1">
               <a:rPr lang="en-US" smtClean="0"/>
-              <a:t>3/5/2019</a:t>
+              <a:t>5/20/2019</a:t>
             </a:fld>
             <a:endParaRPr lang="en-US" dirty="0"/>
           </a:p>
@@ -11722,7 +11722,7 @@
           <a:p>
             <a:fld id="{AA302BF8-B4F3-47E4-9420-B3CB11A05731}" type="datetime1">
               <a:rPr lang="en-US" smtClean="0"/>
-              <a:t>3/5/2019</a:t>
+              <a:t>5/20/2019</a:t>
             </a:fld>
             <a:endParaRPr lang="en-US" dirty="0"/>
           </a:p>
@@ -11966,7 +11966,7 @@
           <a:p>
             <a:fld id="{A25B0EFA-E706-4799-8966-B7427A05D312}" type="datetime1">
               <a:rPr lang="en-US" smtClean="0"/>
-              <a:t>3/5/2019</a:t>
+              <a:t>5/20/2019</a:t>
             </a:fld>
             <a:endParaRPr lang="en-US" dirty="0"/>
           </a:p>
@@ -12351,7 +12351,7 @@
           <a:p>
             <a:fld id="{E6FA995B-F66C-40F1-8A9C-B5751E91C4F2}" type="datetime1">
               <a:rPr lang="en-US" smtClean="0"/>
-              <a:t>3/5/2019</a:t>
+              <a:t>5/20/2019</a:t>
             </a:fld>
             <a:endParaRPr lang="en-US" dirty="0"/>
           </a:p>
@@ -12486,7 +12486,7 @@
           <a:p>
             <a:fld id="{6ECDC2C3-807F-4686-A083-68ADD92A59DE}" type="datetime1">
               <a:rPr lang="en-US" smtClean="0"/>
-              <a:t>3/5/2019</a:t>
+              <a:t>5/20/2019</a:t>
             </a:fld>
             <a:endParaRPr lang="en-US" dirty="0"/>
           </a:p>
@@ -12593,7 +12593,7 @@
           <a:p>
             <a:fld id="{E1DCA3F6-58E9-42EF-BCE1-EAC5B2FB5A7E}" type="datetime1">
               <a:rPr lang="en-US" smtClean="0"/>
-              <a:t>3/5/2019</a:t>
+              <a:t>5/20/2019</a:t>
             </a:fld>
             <a:endParaRPr lang="en-US" dirty="0"/>
           </a:p>
@@ -12860,7 +12860,7 @@
           <a:p>
             <a:fld id="{63EB9CCA-3CB2-4673-AC23-A6818D07AAE0}" type="datetime1">
               <a:rPr lang="en-US" smtClean="0"/>
-              <a:t>3/5/2019</a:t>
+              <a:t>5/20/2019</a:t>
             </a:fld>
             <a:endParaRPr lang="en-US" dirty="0"/>
           </a:p>
@@ -13181,7 +13181,7 @@
           <a:p>
             <a:fld id="{5B973120-FCFA-4CBC-9D1B-38C298200EC7}" type="datetime1">
               <a:rPr lang="en-US" smtClean="0"/>
-              <a:t>3/5/2019</a:t>
+              <a:t>5/20/2019</a:t>
             </a:fld>
             <a:endParaRPr lang="en-US" dirty="0"/>
           </a:p>
@@ -13890,7 +13890,7 @@
           <a:p>
             <a:fld id="{57F96559-9DC5-4677-9809-946D4FEB7FA2}" type="datetime1">
               <a:rPr lang="en-US" smtClean="0"/>
-              <a:t>3/5/2019</a:t>
+              <a:t>5/20/2019</a:t>
             </a:fld>
             <a:endParaRPr lang="en-US" dirty="0"/>
           </a:p>
@@ -15299,44 +15299,6 @@
           </a:p>
         </p:txBody>
       </p:sp>
-      <p:pic>
-        <p:nvPicPr>
-          <p:cNvPr id="4" name="Inhaltsplatzhalter 3">
-            <a:extLst>
-              <a:ext uri="{FF2B5EF4-FFF2-40B4-BE49-F238E27FC236}">
-                <a16:creationId xmlns:a16="http://schemas.microsoft.com/office/drawing/2014/main" id="{CE34CF64-24E8-4BAA-8C6F-7A9DDBB6FD48}"/>
-              </a:ext>
-            </a:extLst>
-          </p:cNvPr>
-          <p:cNvPicPr>
-            <a:picLocks noGrp="1"/>
-          </p:cNvPicPr>
-          <p:nvPr>
-            <p:ph idx="1"/>
-          </p:nvPr>
-        </p:nvPicPr>
-        <p:blipFill>
-          <a:blip r:embed="rId2">
-            <a:extLst>
-              <a:ext uri="{28A0092B-C50C-407E-A947-70E740481C1C}">
-                <a14:useLocalDpi xmlns:a14="http://schemas.microsoft.com/office/drawing/2010/main" val="0"/>
-              </a:ext>
-            </a:extLst>
-          </a:blip>
-          <a:stretch>
-            <a:fillRect/>
-          </a:stretch>
-        </p:blipFill>
-        <p:spPr>
-          <a:xfrm>
-            <a:off x="677334" y="2284843"/>
-            <a:ext cx="9028972" cy="2288314"/>
-          </a:xfrm>
-          <a:prstGeom prst="rect">
-            <a:avLst/>
-          </a:prstGeom>
-        </p:spPr>
-      </p:pic>
       <p:sp>
         <p:nvSpPr>
           <p:cNvPr id="3" name="Fußzeilenplatzhalter 2">
@@ -15366,6 +15328,36 @@
           </a:p>
         </p:txBody>
       </p:sp>
+      <p:pic>
+        <p:nvPicPr>
+          <p:cNvPr id="8" name="Grafik 7">
+            <a:extLst>
+              <a:ext uri="{FF2B5EF4-FFF2-40B4-BE49-F238E27FC236}">
+                <a16:creationId xmlns:a16="http://schemas.microsoft.com/office/drawing/2014/main" id="{1A0359F3-EA57-4F43-BDE2-8AFB48561D34}"/>
+              </a:ext>
+            </a:extLst>
+          </p:cNvPr>
+          <p:cNvPicPr>
+            <a:picLocks noChangeAspect="1"/>
+          </p:cNvPicPr>
+          <p:nvPr/>
+        </p:nvPicPr>
+        <p:blipFill>
+          <a:blip r:embed="rId2"/>
+          <a:stretch>
+            <a:fillRect/>
+          </a:stretch>
+        </p:blipFill>
+        <p:spPr>
+          <a:xfrm>
+            <a:off x="246595" y="2300237"/>
+            <a:ext cx="9573103" cy="2502672"/>
+          </a:xfrm>
+          <a:prstGeom prst="rect">
+            <a:avLst/>
+          </a:prstGeom>
+        </p:spPr>
+      </p:pic>
     </p:spTree>
     <p:extLst>
       <p:ext uri="{BB962C8B-B14F-4D97-AF65-F5344CB8AC3E}">

</xml_diff>

<commit_message>
+Add Mechanical drawing to präsentation :gear:
</commit_message>
<xml_diff>
--- a/Präsentation/Staudenmayer_Schrefl_ProjektRöhrenverstärker.pptx
+++ b/Präsentation/Staudenmayer_Schrefl_ProjektRöhrenverstärker.pptx
@@ -5,7 +5,7 @@
     <p:sldMasterId id="2147483648" r:id="rId1"/>
   </p:sldMasterIdLst>
   <p:notesMasterIdLst>
-    <p:notesMasterId r:id="rId19"/>
+    <p:notesMasterId r:id="rId20"/>
   </p:notesMasterIdLst>
   <p:sldIdLst>
     <p:sldId id="256" r:id="rId2"/>
@@ -25,6 +25,7 @@
     <p:sldId id="271" r:id="rId16"/>
     <p:sldId id="272" r:id="rId17"/>
     <p:sldId id="273" r:id="rId18"/>
+    <p:sldId id="274" r:id="rId19"/>
   </p:sldIdLst>
   <p:sldSz cx="12192000" cy="6858000"/>
   <p:notesSz cx="6858000" cy="9144000"/>
@@ -16374,6 +16375,207 @@
 </p:sld>
 </file>
 
+<file path=ppt/slides/slide18.xml><?xml version="1.0" encoding="utf-8"?>
+<p:sld xmlns:a="http://schemas.openxmlformats.org/drawingml/2006/main" xmlns:r="http://schemas.openxmlformats.org/officeDocument/2006/relationships" xmlns:p="http://schemas.openxmlformats.org/presentationml/2006/main">
+  <p:cSld>
+    <p:spTree>
+      <p:nvGrpSpPr>
+        <p:cNvPr id="1" name=""/>
+        <p:cNvGrpSpPr/>
+        <p:nvPr/>
+      </p:nvGrpSpPr>
+      <p:grpSpPr>
+        <a:xfrm>
+          <a:off x="0" y="0"/>
+          <a:ext cx="0" cy="0"/>
+          <a:chOff x="0" y="0"/>
+          <a:chExt cx="0" cy="0"/>
+        </a:xfrm>
+      </p:grpSpPr>
+      <p:sp>
+        <p:nvSpPr>
+          <p:cNvPr id="2" name="Titel 1">
+            <a:extLst>
+              <a:ext uri="{FF2B5EF4-FFF2-40B4-BE49-F238E27FC236}">
+                <a16:creationId xmlns:a16="http://schemas.microsoft.com/office/drawing/2014/main" id="{CAB10F1E-20C8-4342-8B62-0F80D844F436}"/>
+              </a:ext>
+            </a:extLst>
+          </p:cNvPr>
+          <p:cNvSpPr>
+            <a:spLocks noGrp="1"/>
+          </p:cNvSpPr>
+          <p:nvPr>
+            <p:ph type="title"/>
+          </p:nvPr>
+        </p:nvSpPr>
+        <p:spPr/>
+        <p:txBody>
+          <a:bodyPr/>
+          <a:lstStyle/>
+          <a:p>
+            <a:r>
+              <a:rPr lang="de-AT" dirty="0"/>
+              <a:t>Gehäuse</a:t>
+            </a:r>
+          </a:p>
+        </p:txBody>
+      </p:sp>
+      <p:sp>
+        <p:nvSpPr>
+          <p:cNvPr id="3" name="Inhaltsplatzhalter 2">
+            <a:extLst>
+              <a:ext uri="{FF2B5EF4-FFF2-40B4-BE49-F238E27FC236}">
+                <a16:creationId xmlns:a16="http://schemas.microsoft.com/office/drawing/2014/main" id="{78CC14C2-0D82-41A1-9470-BBAF4A048E2D}"/>
+              </a:ext>
+            </a:extLst>
+          </p:cNvPr>
+          <p:cNvSpPr>
+            <a:spLocks noGrp="1"/>
+          </p:cNvSpPr>
+          <p:nvPr>
+            <p:ph idx="1"/>
+          </p:nvPr>
+        </p:nvSpPr>
+        <p:spPr>
+          <a:xfrm>
+            <a:off x="677334" y="2160589"/>
+            <a:ext cx="3313988" cy="3880773"/>
+          </a:xfrm>
+        </p:spPr>
+        <p:txBody>
+          <a:bodyPr/>
+          <a:lstStyle/>
+          <a:p>
+            <a:r>
+              <a:rPr lang="de-AT" dirty="0"/>
+              <a:t>Alle Spulen zueinander verdreht</a:t>
+            </a:r>
+          </a:p>
+          <a:p>
+            <a:r>
+              <a:rPr lang="de-AT" dirty="0"/>
+              <a:t>Möglichst viel Abstand zwischen Verstärkenden Elementen und Netzteil</a:t>
+            </a:r>
+          </a:p>
+        </p:txBody>
+      </p:sp>
+      <p:sp>
+        <p:nvSpPr>
+          <p:cNvPr id="4" name="Fußzeilenplatzhalter 3">
+            <a:extLst>
+              <a:ext uri="{FF2B5EF4-FFF2-40B4-BE49-F238E27FC236}">
+                <a16:creationId xmlns:a16="http://schemas.microsoft.com/office/drawing/2014/main" id="{E18A95B2-E14B-4C00-89A9-F39371475405}"/>
+              </a:ext>
+            </a:extLst>
+          </p:cNvPr>
+          <p:cNvSpPr>
+            <a:spLocks noGrp="1"/>
+          </p:cNvSpPr>
+          <p:nvPr>
+            <p:ph type="ftr" sz="quarter" idx="11"/>
+          </p:nvPr>
+        </p:nvSpPr>
+        <p:spPr/>
+        <p:txBody>
+          <a:bodyPr/>
+          <a:lstStyle/>
+          <a:p>
+            <a:r>
+              <a:rPr lang="en-US"/>
+              <a:t>Christian Schrefl, Patrik Staudenmayer</a:t>
+            </a:r>
+            <a:endParaRPr lang="en-US" dirty="0"/>
+          </a:p>
+        </p:txBody>
+      </p:sp>
+      <p:graphicFrame>
+        <p:nvGraphicFramePr>
+          <p:cNvPr id="5" name="Objekt 4">
+            <a:extLst>
+              <a:ext uri="{FF2B5EF4-FFF2-40B4-BE49-F238E27FC236}">
+                <a16:creationId xmlns:a16="http://schemas.microsoft.com/office/drawing/2014/main" id="{760DC928-2E54-4ACA-918E-FF7CE1B80C9C}"/>
+              </a:ext>
+            </a:extLst>
+          </p:cNvPr>
+          <p:cNvGraphicFramePr>
+            <a:graphicFrameLocks noChangeAspect="1"/>
+          </p:cNvGraphicFramePr>
+          <p:nvPr>
+            <p:extLst>
+              <p:ext uri="{D42A27DB-BD31-4B8C-83A1-F6EECF244321}">
+                <p14:modId xmlns:p14="http://schemas.microsoft.com/office/powerpoint/2010/main" val="879505707"/>
+              </p:ext>
+            </p:extLst>
+          </p:nvPr>
+        </p:nvGraphicFramePr>
+        <p:xfrm>
+          <a:off x="3991322" y="1153120"/>
+          <a:ext cx="6997380" cy="4888242"/>
+        </p:xfrm>
+        <a:graphic>
+          <a:graphicData uri="http://schemas.openxmlformats.org/presentationml/2006/ole">
+            <mc:AlternateContent xmlns:mc="http://schemas.openxmlformats.org/markup-compatibility/2006">
+              <mc:Choice xmlns:v="urn:schemas-microsoft-com:vml" Requires="v">
+                <p:oleObj spid="_x0000_s1031" name="PDF" r:id="rId3" imgW="0" imgH="360" progId="FoxitReader.Document">
+                  <p:embed/>
+                </p:oleObj>
+              </mc:Choice>
+              <mc:Fallback>
+                <p:oleObj name="PDF" r:id="rId3" imgW="0" imgH="360" progId="FoxitReader.Document">
+                  <p:embed/>
+                  <p:pic>
+                    <p:nvPicPr>
+                      <p:cNvPr id="0" name=""/>
+                      <p:cNvPicPr/>
+                      <p:nvPr/>
+                    </p:nvPicPr>
+                    <p:blipFill>
+                      <a:blip r:embed="rId4"/>
+                      <a:stretch>
+                        <a:fillRect/>
+                      </a:stretch>
+                    </p:blipFill>
+                    <p:spPr>
+                      <a:xfrm>
+                        <a:off x="3991322" y="1153120"/>
+                        <a:ext cx="6997380" cy="4888242"/>
+                      </a:xfrm>
+                      <a:prstGeom prst="rect">
+                        <a:avLst/>
+                      </a:prstGeom>
+                    </p:spPr>
+                  </p:pic>
+                </p:oleObj>
+              </mc:Fallback>
+            </mc:AlternateContent>
+          </a:graphicData>
+        </a:graphic>
+      </p:graphicFrame>
+    </p:spTree>
+    <p:extLst>
+      <p:ext uri="{BB962C8B-B14F-4D97-AF65-F5344CB8AC3E}">
+        <p14:creationId xmlns:p14="http://schemas.microsoft.com/office/powerpoint/2010/main" val="4035325942"/>
+      </p:ext>
+    </p:extLst>
+  </p:cSld>
+  <p:clrMapOvr>
+    <a:masterClrMapping/>
+  </p:clrMapOvr>
+  <mc:AlternateContent xmlns:mc="http://schemas.openxmlformats.org/markup-compatibility/2006" xmlns:p159="http://schemas.microsoft.com/office/powerpoint/2015/09/main">
+    <mc:Choice Requires="p159">
+      <p:transition spd="slow">
+        <p159:morph option="byObject"/>
+      </p:transition>
+    </mc:Choice>
+    <mc:Fallback xmlns="">
+      <p:transition spd="slow">
+        <p:fade/>
+      </p:transition>
+    </mc:Fallback>
+  </mc:AlternateContent>
+</p:sld>
+</file>
+
 <file path=ppt/slides/slide2.xml><?xml version="1.0" encoding="utf-8"?>
 <p:sld xmlns:a="http://schemas.openxmlformats.org/drawingml/2006/main" xmlns:r="http://schemas.openxmlformats.org/officeDocument/2006/relationships" xmlns:p="http://schemas.openxmlformats.org/presentationml/2006/main">
   <p:cSld>
@@ -16407,7 +16609,12 @@
             <p:ph type="title"/>
           </p:nvPr>
         </p:nvSpPr>
-        <p:spPr/>
+        <p:spPr>
+          <a:xfrm>
+            <a:off x="641553" y="514184"/>
+            <a:ext cx="8596668" cy="913075"/>
+          </a:xfrm>
+        </p:spPr>
         <p:txBody>
           <a:bodyPr/>
           <a:lstStyle/>
@@ -16435,10 +16642,15 @@
             <p:ph idx="1"/>
           </p:nvPr>
         </p:nvSpPr>
-        <p:spPr/>
+        <p:spPr>
+          <a:xfrm>
+            <a:off x="677334" y="1463041"/>
+            <a:ext cx="8596668" cy="4578322"/>
+          </a:xfrm>
+        </p:spPr>
         <p:txBody>
           <a:bodyPr>
-            <a:normAutofit fontScale="92500" lnSpcReduction="20000"/>
+            <a:normAutofit lnSpcReduction="10000"/>
           </a:bodyPr>
           <a:lstStyle/>
           <a:p>
@@ -16520,6 +16732,12 @@
             <a:r>
               <a:rPr lang="de-AT" dirty="0"/>
               <a:t>Testaufbau</a:t>
+            </a:r>
+          </a:p>
+          <a:p>
+            <a:r>
+              <a:rPr lang="de-AT" dirty="0"/>
+              <a:t>Gehäuse</a:t>
             </a:r>
           </a:p>
         </p:txBody>

</xml_diff>